<commit_message>
Added majority of Zak's stuff to poster.
</commit_message>
<xml_diff>
--- a/doc/poster/GumboNodePoster.pptx
+++ b/doc/poster/GumboNodePoster.pptx
@@ -3815,23 +3815,7 @@
                 <a:ea typeface="Arial Unicode MS" pitchFamily="2"/>
                 <a:cs typeface="Tahoma" pitchFamily="2"/>
               </a:rPr>
-              <a:t>), </a:t>
-            </a:r>
-            <a:r>
-              <a:rPr lang="en-US" sz="4800" b="1" dirty="0" smtClean="0">
-                <a:latin typeface="Arial" pitchFamily="18"/>
-                <a:ea typeface="Arial Unicode MS" pitchFamily="2"/>
-                <a:cs typeface="Tahoma" pitchFamily="2"/>
-              </a:rPr>
-              <a:t>H. Blake Skinner</a:t>
-            </a:r>
-            <a:r>
-              <a:rPr lang="en-US" sz="4800" b="1" dirty="0" smtClean="0">
-                <a:latin typeface="Arial" pitchFamily="18"/>
-                <a:ea typeface="Arial Unicode MS" pitchFamily="2"/>
-                <a:cs typeface="Tahoma" pitchFamily="2"/>
-              </a:rPr>
-              <a:t> (</a:t>
+              <a:t>), H. Blake Skinner (</a:t>
             </a:r>
             <a:r>
               <a:rPr lang="en-US" sz="4800" b="1" dirty="0" err="1" smtClean="0">
@@ -3839,23 +3823,7 @@
                 <a:ea typeface="Arial Unicode MS" pitchFamily="2"/>
                 <a:cs typeface="Tahoma" pitchFamily="2"/>
               </a:rPr>
-              <a:t>hskinner</a:t>
-            </a:r>
-            <a:r>
-              <a:rPr lang="en-US" sz="4800" b="1" dirty="0" err="1" smtClean="0">
-                <a:latin typeface="Arial" pitchFamily="18"/>
-                <a:ea typeface="Arial Unicode MS" pitchFamily="2"/>
-                <a:cs typeface="Tahoma" pitchFamily="2"/>
-              </a:rPr>
-              <a:t>@</a:t>
-            </a:r>
-            <a:r>
-              <a:rPr lang="en-US" sz="4800" b="1" dirty="0" err="1" smtClean="0">
-                <a:latin typeface="Arial" pitchFamily="18"/>
-                <a:ea typeface="Arial Unicode MS" pitchFamily="2"/>
-                <a:cs typeface="Tahoma" pitchFamily="2"/>
-              </a:rPr>
-              <a:t>ucsc.edu</a:t>
+              <a:t>hskinner@ucsc.edu</a:t>
             </a:r>
             <a:r>
               <a:rPr lang="en-US" sz="4800" b="1" dirty="0" smtClean="0">
@@ -4208,7 +4176,7 @@
         <p:spPr>
           <a:xfrm>
             <a:off x="11658600" y="5638805"/>
-            <a:ext cx="20574000" cy="14455162"/>
+            <a:ext cx="20574000" cy="14232149"/>
           </a:xfrm>
           <a:prstGeom prst="rect">
             <a:avLst/>
@@ -4554,7 +4522,7 @@
         </p:nvSpPr>
         <p:spPr>
           <a:xfrm>
-            <a:off x="806405" y="16013395"/>
+            <a:off x="806405" y="13496694"/>
             <a:ext cx="10058400" cy="1126445"/>
           </a:xfrm>
           <a:custGeom>
@@ -4736,8 +4704,8 @@
         </p:nvSpPr>
         <p:spPr>
           <a:xfrm>
-            <a:off x="11658610" y="14623139"/>
-            <a:ext cx="10277384" cy="2431435"/>
+            <a:off x="11681906" y="13346090"/>
+            <a:ext cx="10277384" cy="7109639"/>
           </a:xfrm>
           <a:prstGeom prst="rect">
             <a:avLst/>
@@ -4756,27 +4724,71 @@
           <a:lstStyle/>
           <a:p>
             <a:r>
+              <a:rPr lang="en-US" sz="3800" dirty="0" smtClean="0"/>
+              <a:t>The </a:t>
+            </a:r>
+            <a:r>
               <a:rPr lang="en-US" sz="3800" dirty="0" err="1" smtClean="0"/>
-              <a:t>Lorem</a:t>
+              <a:t>protypes</a:t>
             </a:r>
             <a:r>
               <a:rPr lang="en-US" sz="3800" dirty="0" smtClean="0"/>
+              <a:t> sat on a breadboard ($1.20/unit). The total cost per node was $7.59 after accounting for shipping and tax.</a:t>
+            </a:r>
+          </a:p>
+          <a:p>
+            <a:r>
+              <a:rPr lang="en-US" sz="3800" dirty="0" smtClean="0"/>
+              <a:t>2 Types of Nodes:</a:t>
+            </a:r>
+          </a:p>
+          <a:p>
+            <a:pPr marL="742950" indent="-742950">
+              <a:buAutoNum type="arabicPeriod"/>
+            </a:pPr>
+            <a:r>
+              <a:rPr lang="en-US" sz="3800" dirty="0" err="1" smtClean="0"/>
+              <a:t>GumboTiny</a:t>
+            </a:r>
+            <a:r>
+              <a:rPr lang="en-US" sz="3800" dirty="0" smtClean="0"/>
+              <a:t>, the proposed hardware</a:t>
+            </a:r>
+          </a:p>
+          <a:p>
+            <a:pPr marL="742950" indent="-742950">
+              <a:buAutoNum type="arabicPeriod"/>
+            </a:pPr>
+            <a:r>
+              <a:rPr lang="en-US" sz="3800" dirty="0" err="1" smtClean="0"/>
+              <a:t>GumboUno</a:t>
+            </a:r>
+            <a:r>
+              <a:rPr lang="en-US" sz="3800" dirty="0" smtClean="0"/>
+              <a:t>, the wireless chip attached to an </a:t>
+            </a:r>
+            <a:r>
+              <a:rPr lang="en-US" sz="3800" dirty="0" err="1" smtClean="0"/>
+              <a:t>Arduino</a:t>
+            </a:r>
+            <a:r>
+              <a:rPr lang="en-US" sz="3800" dirty="0" smtClean="0"/>
+              <a:t> Uno for data output over serial</a:t>
+            </a:r>
+          </a:p>
+          <a:p>
+            <a:r>
+              <a:rPr lang="en-US" sz="3800" dirty="0" smtClean="0"/>
+              <a:t>CC2500 provided numerous hardware features. A 16 bit preamble and 2 byte checksum were</a:t>
+            </a:r>
+            <a:r>
+              <a:rPr lang="en-US" sz="3800" dirty="0"/>
               <a:t> </a:t>
             </a:r>
             <a:r>
-              <a:rPr lang="en-US" sz="3800" dirty="0" err="1" smtClean="0"/>
-              <a:t>Ipsum</a:t>
-            </a:r>
-            <a:r>
               <a:rPr lang="en-US" sz="3800" dirty="0" smtClean="0"/>
-              <a:t>.</a:t>
-            </a:r>
-            <a:endParaRPr lang="en-US" sz="3800" dirty="0" smtClean="0"/>
-          </a:p>
-          <a:p>
-            <a:endParaRPr lang="en-US" sz="3800" dirty="0"/>
-          </a:p>
-          <a:p>
+              <a:t>added to each packet, and link quality indicator was used to determine utility of data from other nodes.</a:t>
+            </a:r>
             <a:endParaRPr lang="en-US" sz="3800" dirty="0" smtClean="0"/>
           </a:p>
           <a:p>
@@ -4888,7 +4900,7 @@
         <p:spPr>
           <a:xfrm>
             <a:off x="33299402" y="6942581"/>
-            <a:ext cx="9525000" cy="3939395"/>
+            <a:ext cx="9525000" cy="8632987"/>
           </a:xfrm>
           <a:custGeom>
             <a:avLst/>
@@ -4951,9 +4963,37 @@
             </a:pPr>
             <a:r>
               <a:rPr lang="en-US" sz="4300" dirty="0" smtClean="0"/>
-              <a:t>Gandalf wasn’t around </a:t>
-            </a:r>
-            <a:endParaRPr lang="en-US" sz="4300" dirty="0"/>
+              <a:t>Hardware too small to support an OS like Tiny or </a:t>
+            </a:r>
+            <a:r>
+              <a:rPr lang="en-US" sz="4300" dirty="0" err="1" smtClean="0"/>
+              <a:t>Contiki</a:t>
+            </a:r>
+            <a:endParaRPr lang="en-US" sz="4300" dirty="0" smtClean="0"/>
+          </a:p>
+          <a:p>
+            <a:pPr marL="822960" indent="-822960" fontAlgn="base">
+              <a:buFont typeface="Arial"/>
+              <a:buChar char="•"/>
+            </a:pPr>
+            <a:r>
+              <a:rPr lang="en-US" sz="4300" dirty="0" err="1" smtClean="0"/>
+              <a:t>Zigbee</a:t>
+            </a:r>
+            <a:r>
+              <a:rPr lang="en-US" sz="4300" dirty="0" smtClean="0"/>
+              <a:t> compatible transceivers too expensive</a:t>
+            </a:r>
+          </a:p>
+          <a:p>
+            <a:pPr marL="822960" indent="-822960" fontAlgn="base">
+              <a:buFont typeface="Arial"/>
+              <a:buChar char="•"/>
+            </a:pPr>
+            <a:r>
+              <a:rPr lang="en-US" sz="4300" dirty="0" smtClean="0"/>
+              <a:t>Low Packet Error Rate surprisingly difficult</a:t>
+            </a:r>
           </a:p>
           <a:p>
             <a:pPr marL="1525219" lvl="1" indent="-822960">
@@ -4962,12 +5002,32 @@
             </a:pPr>
             <a:r>
               <a:rPr lang="en-US" sz="3800" dirty="0" smtClean="0"/>
-              <a:t>Low Morale</a:t>
-            </a:r>
-            <a:endParaRPr lang="en-US" sz="3800" dirty="0"/>
-          </a:p>
-          <a:p>
-            <a:pPr marL="702259" lvl="1"/>
+              <a:t>TX, RX, and Sleep</a:t>
+            </a:r>
+          </a:p>
+          <a:p>
+            <a:pPr marL="1525219" lvl="1" indent="-822960">
+              <a:buFont typeface="Wingdings" charset="2"/>
+              <a:buChar char="Ø"/>
+            </a:pPr>
+            <a:r>
+              <a:rPr lang="en-US" sz="3800" dirty="0" smtClean="0"/>
+              <a:t>Bad data propagates quickly.</a:t>
+            </a:r>
+          </a:p>
+          <a:p>
+            <a:pPr marL="1525219" lvl="1" indent="-822960">
+              <a:buFont typeface="Wingdings" charset="2"/>
+              <a:buChar char="Ø"/>
+            </a:pPr>
+            <a:r>
+              <a:rPr lang="en-US" sz="3800" dirty="0" err="1" smtClean="0"/>
+              <a:t>Multihop</a:t>
+            </a:r>
+            <a:r>
+              <a:rPr lang="en-US" sz="3800" dirty="0" smtClean="0"/>
+              <a:t> = bad data always ‘fresh’</a:t>
+            </a:r>
             <a:endParaRPr lang="en-US" sz="3400" dirty="0"/>
           </a:p>
           <a:p>
@@ -4977,28 +5037,30 @@
             </a:pPr>
             <a:r>
               <a:rPr lang="en-US" sz="4300" dirty="0" err="1" smtClean="0"/>
-              <a:t>Fibby’s</a:t>
-            </a:r>
+              <a:t>Contiki</a:t>
+            </a:r>
+            <a:endParaRPr lang="en-US" sz="4300" dirty="0" smtClean="0"/>
+          </a:p>
+          <a:p>
+            <a:pPr marL="822960" indent="-822960" fontAlgn="base">
+              <a:buFont typeface="Arial"/>
+              <a:buChar char="•"/>
+            </a:pPr>
             <a:r>
               <a:rPr lang="en-US" sz="4300" dirty="0" smtClean="0"/>
-              <a:t> butt has poop</a:t>
+              <a:t>Heartbeats</a:t>
+            </a:r>
+          </a:p>
+          <a:p>
+            <a:pPr marL="822960" indent="-822960" fontAlgn="base">
+              <a:buFont typeface="Arial"/>
+              <a:buChar char="•"/>
+            </a:pPr>
+            <a:r>
+              <a:rPr lang="en-US" sz="4300" dirty="0" smtClean="0"/>
+              <a:t>Random intervals</a:t>
             </a:r>
             <a:endParaRPr lang="en-US" sz="4300" dirty="0"/>
-          </a:p>
-          <a:p>
-            <a:pPr marL="1525219" lvl="1" indent="-822960">
-              <a:buFont typeface="Wingdings" charset="2"/>
-              <a:buChar char="Ø"/>
-            </a:pPr>
-            <a:r>
-              <a:rPr lang="en-US" sz="3800" dirty="0" err="1" smtClean="0"/>
-              <a:t>Ew</a:t>
-            </a:r>
-            <a:r>
-              <a:rPr lang="en-US" sz="3800" dirty="0" smtClean="0"/>
-              <a:t>.</a:t>
-            </a:r>
-            <a:endParaRPr lang="en-US" sz="3800" dirty="0"/>
           </a:p>
         </p:txBody>
       </p:sp>
@@ -5011,7 +5073,7 @@
         <p:spPr>
           <a:xfrm>
             <a:off x="11658599" y="20439538"/>
-            <a:ext cx="20578075" cy="6416996"/>
+            <a:ext cx="20578075" cy="9494762"/>
           </a:xfrm>
           <a:custGeom>
             <a:avLst/>
@@ -5090,8 +5152,20 @@
               <a:buChar char="•"/>
             </a:pPr>
             <a:r>
+              <a:rPr lang="en-US" sz="4300" dirty="0" err="1" smtClean="0"/>
+              <a:t>ContikiOS</a:t>
+            </a:r>
+            <a:r>
               <a:rPr lang="en-US" sz="4300" dirty="0" smtClean="0"/>
-              <a:t>Stuff Sucked</a:t>
+              <a:t> Investigation: Simulation of Heartbeats </a:t>
+            </a:r>
+            <a:r>
+              <a:rPr lang="en-US" sz="4300" dirty="0" err="1" smtClean="0"/>
+              <a:t>vs</a:t>
+            </a:r>
+            <a:r>
+              <a:rPr lang="en-US" sz="4300" dirty="0" smtClean="0"/>
+              <a:t> Random Intervals</a:t>
             </a:r>
             <a:endParaRPr lang="en-US" sz="4300" dirty="0"/>
           </a:p>
@@ -5102,28 +5176,51 @@
             </a:pPr>
             <a:r>
               <a:rPr lang="en-US" sz="3800" dirty="0" smtClean="0"/>
-              <a:t>We dropped them in a vacuum</a:t>
-            </a:r>
-            <a:endParaRPr lang="en-US" sz="3800" dirty="0" smtClean="0"/>
-          </a:p>
-          <a:p>
-            <a:pPr marL="702259" lvl="1"/>
-            <a:endParaRPr lang="en-US" sz="3800" b="1" dirty="0" smtClean="0"/>
-          </a:p>
-          <a:p>
-            <a:pPr marL="702259" lvl="1"/>
-            <a:endParaRPr lang="en-US" sz="3800" b="1" dirty="0"/>
+              <a:t>Deciding between TX, RX, and Sleep</a:t>
+            </a:r>
+            <a:endParaRPr lang="en-US" sz="3800" dirty="0"/>
           </a:p>
           <a:p>
             <a:pPr marL="822960" indent="-822960">
               <a:buFont typeface="Arial"/>
               <a:buChar char="•"/>
             </a:pPr>
+            <a:endParaRPr lang="en-US" sz="4300" dirty="0" smtClean="0"/>
+          </a:p>
+          <a:p>
+            <a:pPr marL="822960" indent="-822960">
+              <a:buFont typeface="Arial"/>
+              <a:buChar char="•"/>
+            </a:pPr>
             <a:r>
               <a:rPr lang="en-US" sz="4300" dirty="0" smtClean="0"/>
-              <a:t>Stuff blew</a:t>
-            </a:r>
-            <a:endParaRPr lang="en-US" sz="4300" dirty="0" smtClean="0"/>
+              <a:t>Built 20 </a:t>
+            </a:r>
+            <a:r>
+              <a:rPr lang="en-US" sz="4300" dirty="0" err="1" smtClean="0"/>
+              <a:t>GumboNodes</a:t>
+            </a:r>
+            <a:r>
+              <a:rPr lang="en-US" sz="4300" dirty="0" smtClean="0"/>
+              <a:t>: 18 </a:t>
+            </a:r>
+            <a:r>
+              <a:rPr lang="en-US" sz="4300" dirty="0" err="1" smtClean="0"/>
+              <a:t>GumboTiny</a:t>
+            </a:r>
+            <a:r>
+              <a:rPr lang="en-US" sz="4300" dirty="0" err="1" smtClean="0"/>
+              <a:t>s</a:t>
+            </a:r>
+            <a:r>
+              <a:rPr lang="en-US" sz="4300" dirty="0" smtClean="0"/>
+              <a:t> and 2 </a:t>
+            </a:r>
+            <a:r>
+              <a:rPr lang="en-US" sz="4300" dirty="0" err="1" smtClean="0"/>
+              <a:t>GumboUnos</a:t>
+            </a:r>
+            <a:endParaRPr lang="en-US" sz="4300" dirty="0"/>
           </a:p>
           <a:p>
             <a:pPr marL="1525219" lvl="1" indent="-822960">
@@ -5131,10 +5228,72 @@
               <a:buChar char="Ø"/>
             </a:pPr>
             <a:r>
+              <a:rPr lang="en-US" sz="3800" smtClean="0"/>
+              <a:t>Simple heartbeat</a:t>
+            </a:r>
+            <a:endParaRPr lang="en-US" sz="3800" dirty="0" smtClean="0"/>
+          </a:p>
+          <a:p>
+            <a:pPr marL="1525219" lvl="1" indent="-822960">
+              <a:buFont typeface="Wingdings" charset="2"/>
+              <a:buChar char="Ø"/>
+            </a:pPr>
+            <a:r>
+              <a:rPr lang="en-US" sz="3800" dirty="0" smtClean="0"/>
+              <a:t>Sleep Current: 2.5mA</a:t>
+            </a:r>
+          </a:p>
+          <a:p>
+            <a:pPr marL="1525219" lvl="1" indent="-822960">
+              <a:buFont typeface="Wingdings" charset="2"/>
+              <a:buChar char="Ø"/>
+            </a:pPr>
+            <a:r>
+              <a:rPr lang="en-US" sz="3800" dirty="0" smtClean="0"/>
+              <a:t>TX/RX Current: 16.mA</a:t>
+            </a:r>
+          </a:p>
+          <a:p>
+            <a:pPr marL="1525219" lvl="1" indent="-822960">
+              <a:buFont typeface="Wingdings" charset="2"/>
+              <a:buChar char="Ø"/>
+            </a:pPr>
+            <a:r>
+              <a:rPr lang="en-US" sz="3800" dirty="0"/>
+              <a:t>L</a:t>
+            </a:r>
+            <a:r>
+              <a:rPr lang="en-US" sz="3800" dirty="0" smtClean="0"/>
+              <a:t>ifetime: 2.5 Days and counting!</a:t>
+            </a:r>
+            <a:endParaRPr lang="en-US" sz="3800" dirty="0"/>
+          </a:p>
+          <a:p>
+            <a:pPr marL="822960" indent="-822960">
+              <a:buFont typeface="Arial"/>
+              <a:buChar char="•"/>
+            </a:pPr>
+            <a:endParaRPr lang="en-US" sz="3800" b="1" dirty="0"/>
+          </a:p>
+          <a:p>
+            <a:pPr marL="822960" indent="-822960">
+              <a:buFont typeface="Arial"/>
+              <a:buChar char="•"/>
+            </a:pPr>
+            <a:r>
+              <a:rPr lang="en-US" sz="4300" dirty="0" smtClean="0"/>
+              <a:t>Stuff blew</a:t>
+            </a:r>
+          </a:p>
+          <a:p>
+            <a:pPr marL="1525219" lvl="1" indent="-822960">
+              <a:buFont typeface="Wingdings" charset="2"/>
+              <a:buChar char="Ø"/>
+            </a:pPr>
+            <a:r>
               <a:rPr lang="en-US" sz="3800" dirty="0" smtClean="0"/>
               <a:t>We dropped them into a fan</a:t>
             </a:r>
-            <a:endParaRPr lang="en-US" sz="3800" dirty="0" smtClean="0"/>
           </a:p>
         </p:txBody>
       </p:sp>
@@ -5381,7 +5540,7 @@
         <p:spPr>
           <a:xfrm>
             <a:off x="33147002" y="17395479"/>
-            <a:ext cx="9677400" cy="3570063"/>
+            <a:ext cx="9677400" cy="4231782"/>
           </a:xfrm>
           <a:custGeom>
             <a:avLst/>
@@ -5444,7 +5603,15 @@
             </a:pPr>
             <a:r>
               <a:rPr lang="en-US" sz="4300" dirty="0" smtClean="0"/>
-              <a:t>Throwing them in places they shouldn’t be</a:t>
+              <a:t>Having </a:t>
+            </a:r>
+            <a:r>
+              <a:rPr lang="en-US" sz="4300" dirty="0" err="1" smtClean="0"/>
+              <a:t>Contiki</a:t>
+            </a:r>
+            <a:r>
+              <a:rPr lang="en-US" sz="4300" dirty="0" smtClean="0"/>
+              <a:t> nodes interact with real nodes</a:t>
             </a:r>
           </a:p>
           <a:p>
@@ -5454,7 +5621,7 @@
             </a:pPr>
             <a:r>
               <a:rPr lang="en-US" sz="4300" dirty="0" smtClean="0"/>
-              <a:t>Eating poop</a:t>
+              <a:t>Determining a way to prevent bad data from propagating.</a:t>
             </a:r>
             <a:endParaRPr lang="en-US" sz="4300" dirty="0" smtClean="0"/>
           </a:p>
@@ -5475,8 +5642,8 @@
         </p:nvSpPr>
         <p:spPr>
           <a:xfrm>
-            <a:off x="806400" y="7799374"/>
-            <a:ext cx="10014000" cy="4000950"/>
+            <a:off x="806400" y="6775205"/>
+            <a:ext cx="10014000" cy="5909165"/>
           </a:xfrm>
           <a:custGeom>
             <a:avLst/>
@@ -5539,9 +5706,20 @@
             </a:pPr>
             <a:r>
               <a:rPr lang="en-US" sz="4300" dirty="0" smtClean="0"/>
-              <a:t>People do things</a:t>
-            </a:r>
-            <a:endParaRPr lang="en-US" sz="4300" dirty="0"/>
+              <a:t>Want to investigate wireless sensor networks</a:t>
+            </a:r>
+            <a:endParaRPr lang="en-US" sz="3800" dirty="0"/>
+          </a:p>
+          <a:p>
+            <a:pPr marL="822960" indent="-822960">
+              <a:buFont typeface="Arial"/>
+              <a:buChar char="•"/>
+            </a:pPr>
+            <a:r>
+              <a:rPr lang="en-US" sz="4300" dirty="0" smtClean="0"/>
+              <a:t>Too Expensive per-node </a:t>
+            </a:r>
+            <a:endParaRPr lang="en-US" sz="3800" dirty="0" smtClean="0"/>
           </a:p>
           <a:p>
             <a:pPr marL="1525219" lvl="1" indent="-822960">
@@ -5550,12 +5728,27 @@
             </a:pPr>
             <a:r>
               <a:rPr lang="en-US" sz="3800" dirty="0" smtClean="0"/>
-              <a:t>We need things</a:t>
-            </a:r>
-            <a:endParaRPr lang="en-US" sz="3800" dirty="0"/>
-          </a:p>
-          <a:p>
-            <a:pPr marL="702259" lvl="1"/>
+              <a:t>$100-150 per mote for </a:t>
+            </a:r>
+            <a:r>
+              <a:rPr lang="en-US" sz="3800" dirty="0" err="1" smtClean="0"/>
+              <a:t>Telos</a:t>
+            </a:r>
+            <a:r>
+              <a:rPr lang="en-US" sz="3800" dirty="0" smtClean="0"/>
+              <a:t> motes</a:t>
+            </a:r>
+            <a:endParaRPr lang="en-US" sz="4300" dirty="0" smtClean="0"/>
+          </a:p>
+          <a:p>
+            <a:pPr marL="1525219" lvl="1" indent="-822960">
+              <a:buFont typeface="Wingdings" charset="2"/>
+              <a:buChar char="Ø"/>
+            </a:pPr>
+            <a:r>
+              <a:rPr lang="en-US" sz="3800" dirty="0" smtClean="0"/>
+              <a:t>Want to evaluate more than just 1-2 nodes</a:t>
+            </a:r>
             <a:endParaRPr lang="en-US" sz="3800" dirty="0"/>
           </a:p>
           <a:p>
@@ -5565,19 +5758,15 @@
             </a:pPr>
             <a:r>
               <a:rPr lang="en-US" sz="4300" dirty="0" smtClean="0"/>
-              <a:t>Things happen</a:t>
-            </a:r>
-            <a:endParaRPr lang="en-US" sz="4300" dirty="0"/>
+              <a:t>Target: 20 Nodes for &lt;$150</a:t>
+            </a:r>
+            <a:endParaRPr lang="en-US" sz="3800" dirty="0"/>
           </a:p>
           <a:p>
             <a:pPr marL="1525219" lvl="1" indent="-822960">
               <a:buFont typeface="Wingdings" charset="2"/>
               <a:buChar char="Ø"/>
             </a:pPr>
-            <a:r>
-              <a:rPr lang="en-US" sz="3800" dirty="0" smtClean="0"/>
-              <a:t>Things happening are good</a:t>
-            </a:r>
             <a:endParaRPr lang="en-US" sz="3800" dirty="0"/>
           </a:p>
         </p:txBody>
@@ -5590,8 +5779,8 @@
         </p:nvSpPr>
         <p:spPr>
           <a:xfrm>
-            <a:off x="927007" y="17191946"/>
-            <a:ext cx="9677400" cy="7309548"/>
+            <a:off x="927007" y="14644685"/>
+            <a:ext cx="9677400" cy="7232604"/>
           </a:xfrm>
           <a:custGeom>
             <a:avLst/>
@@ -5664,19 +5853,22 @@
             </a:pPr>
             <a:r>
               <a:rPr lang="en-US" sz="3800" dirty="0" smtClean="0"/>
-              <a:t>Low </a:t>
-            </a:r>
-            <a:r>
-              <a:rPr lang="en-US" sz="3800" smtClean="0"/>
-              <a:t>Power Sleep Modes</a:t>
-            </a:r>
-            <a:endParaRPr lang="en-US" sz="3800" dirty="0" smtClean="0"/>
+              <a:t>Low Power Sleep </a:t>
+            </a:r>
+            <a:r>
+              <a:rPr lang="en-US" sz="3800" dirty="0" smtClean="0"/>
+              <a:t>Modes</a:t>
+            </a:r>
           </a:p>
           <a:p>
             <a:pPr marL="1525219" lvl="1" indent="-822960">
               <a:buFont typeface="Wingdings" charset="2"/>
               <a:buChar char="Ø"/>
             </a:pPr>
+            <a:r>
+              <a:rPr lang="en-US" sz="3800" dirty="0" smtClean="0"/>
+              <a:t>5 I/O pins</a:t>
+            </a:r>
             <a:endParaRPr lang="en-US" sz="4300" dirty="0" smtClean="0"/>
           </a:p>
           <a:p>
@@ -5696,8 +5888,17 @@
             </a:pPr>
             <a:r>
               <a:rPr lang="en-US" sz="3800" dirty="0" smtClean="0"/>
-              <a:t>Low Power</a:t>
-            </a:r>
+              <a:t>Low </a:t>
+            </a:r>
+            <a:r>
+              <a:rPr lang="en-US" sz="3800" dirty="0" smtClean="0"/>
+              <a:t>Power, Non-</a:t>
+            </a:r>
+            <a:r>
+              <a:rPr lang="en-US" sz="3800" dirty="0" err="1" smtClean="0"/>
+              <a:t>Zigbee</a:t>
+            </a:r>
+            <a:endParaRPr lang="en-US" sz="3800" dirty="0" smtClean="0"/>
           </a:p>
           <a:p>
             <a:pPr marL="1525219" lvl="1" indent="-822960">
@@ -5706,15 +5907,7 @@
             </a:pPr>
             <a:r>
               <a:rPr lang="en-US" sz="3800" dirty="0" smtClean="0"/>
-              <a:t>Not </a:t>
-            </a:r>
-            <a:r>
-              <a:rPr lang="en-US" sz="3800" dirty="0" err="1" smtClean="0"/>
-              <a:t>Zigbee</a:t>
-            </a:r>
-            <a:r>
-              <a:rPr lang="en-US" sz="3800" dirty="0" smtClean="0"/>
-              <a:t> Compatible</a:t>
+              <a:t>Outputs LQI and RSSI</a:t>
             </a:r>
             <a:endParaRPr lang="en-US" sz="4300" dirty="0" smtClean="0"/>
           </a:p>
@@ -5753,7 +5946,7 @@
         </p:nvSpPr>
         <p:spPr>
           <a:xfrm>
-            <a:off x="806405" y="24040541"/>
+            <a:off x="762000" y="24603763"/>
             <a:ext cx="10058400" cy="1126445"/>
           </a:xfrm>
           <a:custGeom>
@@ -5848,7 +6041,7 @@
         </p:nvSpPr>
         <p:spPr>
           <a:xfrm>
-            <a:off x="762002" y="25166988"/>
+            <a:off x="762000" y="25730208"/>
             <a:ext cx="9677400" cy="2246624"/>
           </a:xfrm>
           <a:custGeom>
@@ -5928,52 +6121,6 @@
               <a:rPr lang="en-US" sz="4300" dirty="0" smtClean="0"/>
               <a:t>Not a raft</a:t>
             </a:r>
-            <a:endParaRPr lang="en-US" sz="3800" dirty="0"/>
-          </a:p>
-        </p:txBody>
-      </p:sp>
-      <p:sp>
-        <p:nvSpPr>
-          <p:cNvPr id="32" name="TextBox 31"/>
-          <p:cNvSpPr txBox="1"/>
-          <p:nvPr/>
-        </p:nvSpPr>
-        <p:spPr>
-          <a:xfrm>
-            <a:off x="21901300" y="14606445"/>
-            <a:ext cx="10331299" cy="1261884"/>
-          </a:xfrm>
-          <a:prstGeom prst="rect">
-            <a:avLst/>
-          </a:prstGeom>
-          <a:noFill/>
-          <a:ln>
-            <a:solidFill>
-              <a:schemeClr val="tx1"/>
-            </a:solidFill>
-          </a:ln>
-        </p:spPr>
-        <p:txBody>
-          <a:bodyPr wrap="square" rtlCol="0">
-            <a:spAutoFit/>
-          </a:bodyPr>
-          <a:lstStyle/>
-          <a:p>
-            <a:r>
-              <a:rPr lang="en-US" sz="3800" dirty="0" err="1" smtClean="0"/>
-              <a:t>Lorem</a:t>
-            </a:r>
-            <a:r>
-              <a:rPr lang="en-US" sz="3800" dirty="0" smtClean="0"/>
-              <a:t> </a:t>
-            </a:r>
-            <a:r>
-              <a:rPr lang="en-US" sz="3800" dirty="0" err="1" smtClean="0"/>
-              <a:t>Ipsum</a:t>
-            </a:r>
-            <a:endParaRPr lang="en-US" sz="3800" dirty="0"/>
-          </a:p>
-          <a:p>
             <a:endParaRPr lang="en-US" sz="3800" dirty="0"/>
           </a:p>
         </p:txBody>
@@ -6155,6 +6302,129 @@
           </a:p>
         </p:txBody>
       </p:sp>
+      <p:pic>
+        <p:nvPicPr>
+          <p:cNvPr id="6" name="Picture 5" descr="Screen Shot 2013-12-02 at 4.34.54 PM.png"/>
+          <p:cNvPicPr>
+            <a:picLocks noChangeAspect="1"/>
+          </p:cNvPicPr>
+          <p:nvPr/>
+        </p:nvPicPr>
+        <p:blipFill>
+          <a:blip r:embed="rId6">
+            <a:extLst>
+              <a:ext uri="{28A0092B-C50C-407E-A947-70E740481C1C}">
+                <a14:useLocalDpi xmlns:a14="http://schemas.microsoft.com/office/drawing/2010/main" val="0"/>
+              </a:ext>
+            </a:extLst>
+          </a:blip>
+          <a:stretch>
+            <a:fillRect/>
+          </a:stretch>
+        </p:blipFill>
+        <p:spPr>
+          <a:xfrm>
+            <a:off x="927008" y="20439538"/>
+            <a:ext cx="9937798" cy="3726674"/>
+          </a:xfrm>
+          <a:prstGeom prst="rect">
+            <a:avLst/>
+          </a:prstGeom>
+        </p:spPr>
+      </p:pic>
+      <p:sp>
+        <p:nvSpPr>
+          <p:cNvPr id="33" name="TextBox 32"/>
+          <p:cNvSpPr txBox="1"/>
+          <p:nvPr/>
+        </p:nvSpPr>
+        <p:spPr>
+          <a:xfrm>
+            <a:off x="21959290" y="13367969"/>
+            <a:ext cx="10277384" cy="6524864"/>
+          </a:xfrm>
+          <a:prstGeom prst="rect">
+            <a:avLst/>
+          </a:prstGeom>
+          <a:noFill/>
+          <a:ln>
+            <a:solidFill>
+              <a:schemeClr val="tx1"/>
+            </a:solidFill>
+          </a:ln>
+        </p:spPr>
+        <p:txBody>
+          <a:bodyPr wrap="square" rtlCol="0">
+            <a:spAutoFit/>
+          </a:bodyPr>
+          <a:lstStyle/>
+          <a:p>
+            <a:r>
+              <a:rPr lang="en-US" sz="3800" dirty="0" err="1" smtClean="0"/>
+              <a:t>ContikiOS</a:t>
+            </a:r>
+            <a:r>
+              <a:rPr lang="en-US" sz="3800" dirty="0" smtClean="0"/>
+              <a:t> was used to simulate the nodes and investigate network throughput as well as overall performance between various types of communication</a:t>
+            </a:r>
+            <a:r>
+              <a:rPr lang="en-US" sz="3800" dirty="0"/>
+              <a:t>.</a:t>
+            </a:r>
+          </a:p>
+          <a:p>
+            <a:endParaRPr lang="en-US" sz="3800" dirty="0" smtClean="0"/>
+          </a:p>
+          <a:p>
+            <a:endParaRPr lang="en-US" sz="3800" dirty="0"/>
+          </a:p>
+          <a:p>
+            <a:endParaRPr lang="en-US" sz="3800" dirty="0" smtClean="0"/>
+          </a:p>
+          <a:p>
+            <a:endParaRPr lang="en-US" sz="3800" dirty="0" smtClean="0"/>
+          </a:p>
+          <a:p>
+            <a:endParaRPr lang="en-US" sz="3800" dirty="0"/>
+          </a:p>
+          <a:p>
+            <a:endParaRPr lang="en-US" sz="3800" dirty="0" smtClean="0"/>
+          </a:p>
+          <a:p>
+            <a:endParaRPr lang="en-US" sz="3800" dirty="0"/>
+          </a:p>
+        </p:txBody>
+      </p:sp>
+      <p:pic>
+        <p:nvPicPr>
+          <p:cNvPr id="10" name="Picture 9" descr="20131122_161312 (1).jpg"/>
+          <p:cNvPicPr>
+            <a:picLocks noChangeAspect="1"/>
+          </p:cNvPicPr>
+          <p:nvPr/>
+        </p:nvPicPr>
+        <p:blipFill>
+          <a:blip r:embed="rId7">
+            <a:extLst>
+              <a:ext uri="{28A0092B-C50C-407E-A947-70E740481C1C}">
+                <a14:useLocalDpi xmlns:a14="http://schemas.microsoft.com/office/drawing/2010/main" val="0"/>
+              </a:ext>
+            </a:extLst>
+          </a:blip>
+          <a:stretch>
+            <a:fillRect/>
+          </a:stretch>
+        </p:blipFill>
+        <p:spPr>
+          <a:xfrm>
+            <a:off x="11658599" y="6762167"/>
+            <a:ext cx="10428131" cy="6583923"/>
+          </a:xfrm>
+          <a:prstGeom prst="rect">
+            <a:avLst/>
+          </a:prstGeom>
+        </p:spPr>
+      </p:pic>
     </p:spTree>
     <p:extLst>
       <p:ext uri="{BB962C8B-B14F-4D97-AF65-F5344CB8AC3E}">

</xml_diff>